<commit_message>
TIL 2 주차 작성 20211230
</commit_message>
<xml_diff>
--- a/TIL.pptx
+++ b/TIL.pptx
@@ -6,6 +6,7 @@
   </p:sldMasterIdLst>
   <p:sldIdLst>
     <p:sldId id="256" r:id="rId2"/>
+    <p:sldId id="257" r:id="rId3"/>
   </p:sldIdLst>
   <p:sldSz cx="12192000" cy="6858000"/>
   <p:notesSz cx="6858000" cy="9144000"/>
@@ -104,6 +105,11 @@
       </a:defRPr>
     </a:lvl9pPr>
   </p:defaultTextStyle>
+  <p:extLst>
+    <p:ext uri="{EFAFB233-063F-42B5-8137-9DF3F51BA10A}">
+      <p15:sldGuideLst xmlns:p15="http://schemas.microsoft.com/office/powerpoint/2012/main"/>
+    </p:ext>
+  </p:extLst>
 </p:presentation>
 </file>
 
@@ -238,7 +244,7 @@
           <a:p>
             <a:fld id="{86F67E18-06E4-43CD-90C6-12F80F0662AD}" type="datetimeFigureOut">
               <a:rPr lang="ko-KR" altLang="en-US" smtClean="0"/>
-              <a:t>2021-12-18</a:t>
+              <a:t>2021-12-30</a:t>
             </a:fld>
             <a:endParaRPr lang="ko-KR" altLang="en-US"/>
           </a:p>
@@ -408,7 +414,7 @@
           <a:p>
             <a:fld id="{86F67E18-06E4-43CD-90C6-12F80F0662AD}" type="datetimeFigureOut">
               <a:rPr lang="ko-KR" altLang="en-US" smtClean="0"/>
-              <a:t>2021-12-18</a:t>
+              <a:t>2021-12-30</a:t>
             </a:fld>
             <a:endParaRPr lang="ko-KR" altLang="en-US"/>
           </a:p>
@@ -588,7 +594,7 @@
           <a:p>
             <a:fld id="{86F67E18-06E4-43CD-90C6-12F80F0662AD}" type="datetimeFigureOut">
               <a:rPr lang="ko-KR" altLang="en-US" smtClean="0"/>
-              <a:t>2021-12-18</a:t>
+              <a:t>2021-12-30</a:t>
             </a:fld>
             <a:endParaRPr lang="ko-KR" altLang="en-US"/>
           </a:p>
@@ -758,7 +764,7 @@
           <a:p>
             <a:fld id="{86F67E18-06E4-43CD-90C6-12F80F0662AD}" type="datetimeFigureOut">
               <a:rPr lang="ko-KR" altLang="en-US" smtClean="0"/>
-              <a:t>2021-12-18</a:t>
+              <a:t>2021-12-30</a:t>
             </a:fld>
             <a:endParaRPr lang="ko-KR" altLang="en-US"/>
           </a:p>
@@ -1004,7 +1010,7 @@
           <a:p>
             <a:fld id="{86F67E18-06E4-43CD-90C6-12F80F0662AD}" type="datetimeFigureOut">
               <a:rPr lang="ko-KR" altLang="en-US" smtClean="0"/>
-              <a:t>2021-12-18</a:t>
+              <a:t>2021-12-30</a:t>
             </a:fld>
             <a:endParaRPr lang="ko-KR" altLang="en-US"/>
           </a:p>
@@ -1236,7 +1242,7 @@
           <a:p>
             <a:fld id="{86F67E18-06E4-43CD-90C6-12F80F0662AD}" type="datetimeFigureOut">
               <a:rPr lang="ko-KR" altLang="en-US" smtClean="0"/>
-              <a:t>2021-12-18</a:t>
+              <a:t>2021-12-30</a:t>
             </a:fld>
             <a:endParaRPr lang="ko-KR" altLang="en-US"/>
           </a:p>
@@ -1603,7 +1609,7 @@
           <a:p>
             <a:fld id="{86F67E18-06E4-43CD-90C6-12F80F0662AD}" type="datetimeFigureOut">
               <a:rPr lang="ko-KR" altLang="en-US" smtClean="0"/>
-              <a:t>2021-12-18</a:t>
+              <a:t>2021-12-30</a:t>
             </a:fld>
             <a:endParaRPr lang="ko-KR" altLang="en-US"/>
           </a:p>
@@ -1721,7 +1727,7 @@
           <a:p>
             <a:fld id="{86F67E18-06E4-43CD-90C6-12F80F0662AD}" type="datetimeFigureOut">
               <a:rPr lang="ko-KR" altLang="en-US" smtClean="0"/>
-              <a:t>2021-12-18</a:t>
+              <a:t>2021-12-30</a:t>
             </a:fld>
             <a:endParaRPr lang="ko-KR" altLang="en-US"/>
           </a:p>
@@ -1816,7 +1822,7 @@
           <a:p>
             <a:fld id="{86F67E18-06E4-43CD-90C6-12F80F0662AD}" type="datetimeFigureOut">
               <a:rPr lang="ko-KR" altLang="en-US" smtClean="0"/>
-              <a:t>2021-12-18</a:t>
+              <a:t>2021-12-30</a:t>
             </a:fld>
             <a:endParaRPr lang="ko-KR" altLang="en-US"/>
           </a:p>
@@ -2093,7 +2099,7 @@
           <a:p>
             <a:fld id="{86F67E18-06E4-43CD-90C6-12F80F0662AD}" type="datetimeFigureOut">
               <a:rPr lang="ko-KR" altLang="en-US" smtClean="0"/>
-              <a:t>2021-12-18</a:t>
+              <a:t>2021-12-30</a:t>
             </a:fld>
             <a:endParaRPr lang="ko-KR" altLang="en-US"/>
           </a:p>
@@ -2346,7 +2352,7 @@
           <a:p>
             <a:fld id="{86F67E18-06E4-43CD-90C6-12F80F0662AD}" type="datetimeFigureOut">
               <a:rPr lang="ko-KR" altLang="en-US" smtClean="0"/>
-              <a:t>2021-12-18</a:t>
+              <a:t>2021-12-30</a:t>
             </a:fld>
             <a:endParaRPr lang="ko-KR" altLang="en-US"/>
           </a:p>
@@ -2559,7 +2565,7 @@
           <a:p>
             <a:fld id="{86F67E18-06E4-43CD-90C6-12F80F0662AD}" type="datetimeFigureOut">
               <a:rPr lang="ko-KR" altLang="en-US" smtClean="0"/>
-              <a:t>2021-12-18</a:t>
+              <a:t>2021-12-30</a:t>
             </a:fld>
             <a:endParaRPr lang="ko-KR" altLang="en-US"/>
           </a:p>
@@ -3284,11 +3290,7 @@
             </a:r>
             <a:r>
               <a:rPr lang="ko-KR" altLang="en-US" dirty="0" smtClean="0"/>
-              <a:t>원격</a:t>
-            </a:r>
-            <a:r>
-              <a:rPr lang="ko-KR" altLang="en-US" dirty="0" smtClean="0"/>
-              <a:t> </a:t>
+              <a:t>원격 </a:t>
             </a:r>
             <a:r>
               <a:rPr lang="en-US" altLang="ko-KR" dirty="0" smtClean="0"/>
@@ -3304,13 +3306,7 @@
               <a:rPr lang="ko-KR" altLang="en-US" dirty="0" smtClean="0">
                 <a:sym typeface="Wingdings" panose="05000000000000000000" pitchFamily="2" charset="2"/>
               </a:rPr>
-              <a:t>로컬</a:t>
-            </a:r>
-            <a:r>
-              <a:rPr lang="ko-KR" altLang="en-US" dirty="0" smtClean="0">
-                <a:sym typeface="Wingdings" panose="05000000000000000000" pitchFamily="2" charset="2"/>
-              </a:rPr>
-              <a:t> </a:t>
+              <a:t>로컬 </a:t>
             </a:r>
             <a:r>
               <a:rPr lang="en-US" altLang="ko-KR" dirty="0" smtClean="0">
@@ -3499,6 +3495,652 @@
     <p:extLst>
       <p:ext uri="{BB962C8B-B14F-4D97-AF65-F5344CB8AC3E}">
         <p14:creationId xmlns:p14="http://schemas.microsoft.com/office/powerpoint/2010/main" val="1051648029"/>
+      </p:ext>
+    </p:extLst>
+  </p:cSld>
+  <p:clrMapOvr>
+    <a:masterClrMapping/>
+  </p:clrMapOvr>
+</p:sld>
+</file>
+
+<file path=ppt/slides/slide2.xml><?xml version="1.0" encoding="utf-8"?>
+<p:sld xmlns:a="http://schemas.openxmlformats.org/drawingml/2006/main" xmlns:r="http://schemas.openxmlformats.org/officeDocument/2006/relationships" xmlns:p="http://schemas.openxmlformats.org/presentationml/2006/main">
+  <p:cSld>
+    <p:spTree>
+      <p:nvGrpSpPr>
+        <p:cNvPr id="1" name=""/>
+        <p:cNvGrpSpPr/>
+        <p:nvPr/>
+      </p:nvGrpSpPr>
+      <p:grpSpPr>
+        <a:xfrm>
+          <a:off x="0" y="0"/>
+          <a:ext cx="0" cy="0"/>
+          <a:chOff x="0" y="0"/>
+          <a:chExt cx="0" cy="0"/>
+        </a:xfrm>
+      </p:grpSpPr>
+      <p:sp>
+        <p:nvSpPr>
+          <p:cNvPr id="5" name="TextBox 4"/>
+          <p:cNvSpPr txBox="1"/>
+          <p:nvPr/>
+        </p:nvSpPr>
+        <p:spPr>
+          <a:xfrm>
+            <a:off x="457515" y="977538"/>
+            <a:ext cx="6747360" cy="369332"/>
+          </a:xfrm>
+          <a:prstGeom prst="rect">
+            <a:avLst/>
+          </a:prstGeom>
+          <a:noFill/>
+        </p:spPr>
+        <p:txBody>
+          <a:bodyPr wrap="none" rtlCol="0">
+            <a:spAutoFit/>
+          </a:bodyPr>
+          <a:lstStyle/>
+          <a:p>
+            <a:r>
+              <a:rPr lang="ko-KR" altLang="en-US" dirty="0" smtClean="0"/>
+              <a:t>학습 목적 </a:t>
+            </a:r>
+            <a:r>
+              <a:rPr lang="en-US" altLang="ko-KR" dirty="0" smtClean="0"/>
+              <a:t>:</a:t>
+            </a:r>
+            <a:r>
+              <a:rPr lang="ko-KR" altLang="en-US" dirty="0" err="1" smtClean="0"/>
+              <a:t>협업할때의</a:t>
+            </a:r>
+            <a:r>
+              <a:rPr lang="ko-KR" altLang="en-US" dirty="0" smtClean="0"/>
+              <a:t> 단계</a:t>
+            </a:r>
+            <a:r>
+              <a:rPr lang="en-US" altLang="ko-KR" dirty="0" smtClean="0"/>
+              <a:t>, </a:t>
+            </a:r>
+            <a:r>
+              <a:rPr lang="ko-KR" altLang="en-US" dirty="0" err="1" smtClean="0"/>
+              <a:t>브랜치</a:t>
+            </a:r>
+            <a:r>
+              <a:rPr lang="ko-KR" altLang="en-US" dirty="0" smtClean="0"/>
+              <a:t> 관리 </a:t>
+            </a:r>
+            <a:r>
+              <a:rPr lang="en-US" altLang="ko-KR" dirty="0" smtClean="0"/>
+              <a:t>, </a:t>
+            </a:r>
+            <a:r>
+              <a:rPr lang="en-US" altLang="ko-KR" dirty="0" err="1" smtClean="0"/>
+              <a:t>Github</a:t>
+            </a:r>
+            <a:r>
+              <a:rPr lang="en-US" altLang="ko-KR" dirty="0" smtClean="0"/>
+              <a:t> </a:t>
+            </a:r>
+            <a:r>
+              <a:rPr lang="ko-KR" altLang="en-US" dirty="0" smtClean="0"/>
+              <a:t>에 </a:t>
+            </a:r>
+            <a:r>
+              <a:rPr lang="en-US" altLang="ko-KR" dirty="0" smtClean="0"/>
+              <a:t>push </a:t>
+            </a:r>
+            <a:r>
+              <a:rPr lang="ko-KR" altLang="en-US" dirty="0" smtClean="0"/>
+              <a:t>하기</a:t>
+            </a:r>
+            <a:endParaRPr lang="en-US" altLang="ko-KR" dirty="0" smtClean="0"/>
+          </a:p>
+        </p:txBody>
+      </p:sp>
+      <p:sp>
+        <p:nvSpPr>
+          <p:cNvPr id="6" name="TextBox 5"/>
+          <p:cNvSpPr txBox="1"/>
+          <p:nvPr/>
+        </p:nvSpPr>
+        <p:spPr>
+          <a:xfrm>
+            <a:off x="457515" y="1533220"/>
+            <a:ext cx="8988999" cy="4801314"/>
+          </a:xfrm>
+          <a:prstGeom prst="rect">
+            <a:avLst/>
+          </a:prstGeom>
+          <a:noFill/>
+        </p:spPr>
+        <p:txBody>
+          <a:bodyPr wrap="none" rtlCol="0">
+            <a:spAutoFit/>
+          </a:bodyPr>
+          <a:lstStyle/>
+          <a:p>
+            <a:r>
+              <a:rPr lang="en-US" altLang="ko-KR" dirty="0" smtClean="0"/>
+              <a:t>2 </a:t>
+            </a:r>
+            <a:r>
+              <a:rPr lang="ko-KR" altLang="en-US" dirty="0" smtClean="0"/>
+              <a:t>주차 </a:t>
+            </a:r>
+            <a:r>
+              <a:rPr lang="ko-KR" altLang="en-US" dirty="0" smtClean="0"/>
+              <a:t>배운 내용  </a:t>
+            </a:r>
+            <a:endParaRPr lang="en-US" altLang="ko-KR" dirty="0"/>
+          </a:p>
+          <a:p>
+            <a:endParaRPr lang="en-US" altLang="ko-KR" dirty="0" smtClean="0"/>
+          </a:p>
+          <a:p>
+            <a:pPr marL="342900" indent="-342900">
+              <a:buAutoNum type="arabicParenR"/>
+            </a:pPr>
+            <a:r>
+              <a:rPr lang="ko-KR" altLang="en-US" dirty="0" smtClean="0"/>
+              <a:t>협업 </a:t>
+            </a:r>
+            <a:endParaRPr lang="en-US" altLang="ko-KR" dirty="0" smtClean="0"/>
+          </a:p>
+          <a:p>
+            <a:r>
+              <a:rPr lang="en-US" altLang="ko-KR" dirty="0" smtClean="0"/>
+              <a:t>    </a:t>
+            </a:r>
+            <a:r>
+              <a:rPr lang="ko-KR" altLang="en-US" dirty="0" err="1" smtClean="0"/>
+              <a:t>브랜치</a:t>
+            </a:r>
+            <a:r>
+              <a:rPr lang="ko-KR" altLang="en-US" dirty="0" smtClean="0"/>
+              <a:t> 생성하기 </a:t>
+            </a:r>
+            <a:endParaRPr lang="en-US" altLang="ko-KR" dirty="0" smtClean="0"/>
+          </a:p>
+          <a:p>
+            <a:r>
+              <a:rPr lang="en-US" altLang="ko-KR" dirty="0"/>
+              <a:t> </a:t>
+            </a:r>
+            <a:r>
+              <a:rPr lang="en-US" altLang="ko-KR" dirty="0" smtClean="0"/>
+              <a:t>   </a:t>
+            </a:r>
+            <a:endParaRPr lang="en-US" altLang="ko-KR" dirty="0" smtClean="0"/>
+          </a:p>
+          <a:p>
+            <a:pPr marL="342900" indent="-342900">
+              <a:buAutoNum type="arabicParenR" startAt="2"/>
+            </a:pPr>
+            <a:r>
+              <a:rPr lang="ko-KR" altLang="en-US" dirty="0" err="1" smtClean="0"/>
+              <a:t>브랜치</a:t>
+            </a:r>
+            <a:r>
+              <a:rPr lang="ko-KR" altLang="en-US" dirty="0" smtClean="0"/>
+              <a:t> </a:t>
+            </a:r>
+            <a:r>
+              <a:rPr lang="en-US" altLang="ko-KR" dirty="0" smtClean="0"/>
+              <a:t>Merge </a:t>
+            </a:r>
+            <a:r>
+              <a:rPr lang="ko-KR" altLang="en-US" dirty="0" smtClean="0"/>
+              <a:t>하기</a:t>
+            </a:r>
+            <a:endParaRPr lang="en-US" altLang="ko-KR" dirty="0" smtClean="0"/>
+          </a:p>
+          <a:p>
+            <a:r>
+              <a:rPr lang="en-US" altLang="ko-KR" dirty="0"/>
+              <a:t> </a:t>
+            </a:r>
+            <a:r>
+              <a:rPr lang="en-US" altLang="ko-KR" dirty="0" smtClean="0"/>
+              <a:t>   </a:t>
+            </a:r>
+            <a:r>
+              <a:rPr lang="en-US" altLang="ko-KR" dirty="0" smtClean="0"/>
+              <a:t>: </a:t>
+            </a:r>
+            <a:r>
+              <a:rPr lang="ko-KR" altLang="en-US" dirty="0" smtClean="0"/>
+              <a:t>로컬 </a:t>
+            </a:r>
+            <a:r>
+              <a:rPr lang="en-US" altLang="ko-KR" dirty="0" smtClean="0"/>
+              <a:t>repro </a:t>
+            </a:r>
+            <a:r>
+              <a:rPr lang="ko-KR" altLang="en-US" dirty="0" smtClean="0"/>
+              <a:t>에서 </a:t>
+            </a:r>
+            <a:r>
+              <a:rPr lang="en-US" altLang="ko-KR" dirty="0" smtClean="0"/>
+              <a:t>Merge </a:t>
+            </a:r>
+            <a:r>
+              <a:rPr lang="ko-KR" altLang="en-US" dirty="0" smtClean="0"/>
+              <a:t>하기 </a:t>
+            </a:r>
+            <a:endParaRPr lang="en-US" altLang="ko-KR" dirty="0" smtClean="0"/>
+          </a:p>
+          <a:p>
+            <a:r>
+              <a:rPr lang="en-US" altLang="ko-KR" dirty="0"/>
+              <a:t> </a:t>
+            </a:r>
+            <a:r>
+              <a:rPr lang="en-US" altLang="ko-KR" dirty="0" smtClean="0"/>
+              <a:t>     - </a:t>
+            </a:r>
+            <a:r>
+              <a:rPr lang="ko-KR" altLang="en-US" dirty="0" smtClean="0"/>
+              <a:t>목적지 </a:t>
+            </a:r>
+            <a:r>
+              <a:rPr lang="ko-KR" altLang="en-US" dirty="0" err="1" smtClean="0"/>
+              <a:t>브랜치</a:t>
+            </a:r>
+            <a:r>
+              <a:rPr lang="ko-KR" altLang="en-US" dirty="0" smtClean="0"/>
+              <a:t> </a:t>
+            </a:r>
+            <a:r>
+              <a:rPr lang="en-US" altLang="ko-KR" dirty="0" smtClean="0"/>
+              <a:t>check-out </a:t>
+            </a:r>
+            <a:r>
+              <a:rPr lang="ko-KR" altLang="en-US" dirty="0" smtClean="0"/>
+              <a:t>하기 </a:t>
+            </a:r>
+            <a:r>
+              <a:rPr lang="en-US" altLang="ko-KR" dirty="0" smtClean="0"/>
+              <a:t>--&gt; </a:t>
+            </a:r>
+            <a:r>
+              <a:rPr lang="ko-KR" altLang="en-US" dirty="0" smtClean="0"/>
+              <a:t>머지 대상 </a:t>
+            </a:r>
+            <a:r>
+              <a:rPr lang="en-US" altLang="ko-KR" dirty="0" err="1" smtClean="0"/>
+              <a:t>brach</a:t>
+            </a:r>
+            <a:r>
+              <a:rPr lang="en-US" altLang="ko-KR" dirty="0" smtClean="0"/>
+              <a:t> </a:t>
+            </a:r>
+            <a:r>
+              <a:rPr lang="ko-KR" altLang="en-US" dirty="0" err="1" smtClean="0"/>
+              <a:t>선택후</a:t>
+            </a:r>
+            <a:r>
+              <a:rPr lang="ko-KR" altLang="en-US" dirty="0" smtClean="0"/>
+              <a:t> </a:t>
+            </a:r>
+            <a:r>
+              <a:rPr lang="en-US" altLang="ko-KR" dirty="0" smtClean="0"/>
+              <a:t>merge </a:t>
+            </a:r>
+            <a:r>
+              <a:rPr lang="ko-KR" altLang="en-US" dirty="0" smtClean="0"/>
+              <a:t>버튼 누르기</a:t>
+            </a:r>
+            <a:endParaRPr lang="en-US" altLang="ko-KR" dirty="0"/>
+          </a:p>
+          <a:p>
+            <a:r>
+              <a:rPr lang="ko-KR" altLang="en-US" dirty="0" smtClean="0"/>
+              <a:t>    </a:t>
+            </a:r>
+            <a:r>
+              <a:rPr lang="en-US" altLang="ko-KR" dirty="0" smtClean="0"/>
+              <a:t>: Merge</a:t>
+            </a:r>
+            <a:r>
+              <a:rPr lang="ko-KR" altLang="en-US" dirty="0" smtClean="0"/>
+              <a:t> </a:t>
+            </a:r>
+            <a:r>
+              <a:rPr lang="en-US" altLang="ko-KR" dirty="0"/>
+              <a:t>Conflict </a:t>
+            </a:r>
+            <a:r>
+              <a:rPr lang="ko-KR" altLang="en-US" dirty="0"/>
+              <a:t>해결하기</a:t>
+            </a:r>
+            <a:endParaRPr lang="en-US" altLang="ko-KR" dirty="0"/>
+          </a:p>
+          <a:p>
+            <a:r>
+              <a:rPr lang="en-US" altLang="ko-KR" dirty="0" smtClean="0"/>
+              <a:t>    : </a:t>
+            </a:r>
+            <a:r>
+              <a:rPr lang="ko-KR" altLang="en-US" dirty="0" smtClean="0"/>
+              <a:t>로컬 </a:t>
+            </a:r>
+            <a:r>
+              <a:rPr lang="en-US" altLang="ko-KR" dirty="0" smtClean="0"/>
+              <a:t>repro </a:t>
+            </a:r>
+            <a:r>
+              <a:rPr lang="ko-KR" altLang="en-US" dirty="0" err="1" smtClean="0"/>
+              <a:t>브랜치</a:t>
+            </a:r>
+            <a:r>
+              <a:rPr lang="ko-KR" altLang="en-US" dirty="0" smtClean="0"/>
+              <a:t> 삭제하기 </a:t>
+            </a:r>
+            <a:endParaRPr lang="en-US" altLang="ko-KR" dirty="0" smtClean="0"/>
+          </a:p>
+          <a:p>
+            <a:endParaRPr lang="en-US" altLang="ko-KR" dirty="0" smtClean="0"/>
+          </a:p>
+          <a:p>
+            <a:r>
+              <a:rPr lang="en-US" altLang="ko-KR" dirty="0" smtClean="0"/>
+              <a:t>3) </a:t>
+            </a:r>
+            <a:r>
+              <a:rPr lang="en-US" altLang="ko-KR" dirty="0" err="1" smtClean="0"/>
+              <a:t>Git</a:t>
+            </a:r>
+            <a:r>
+              <a:rPr lang="en-US" altLang="ko-KR" dirty="0" err="1" smtClean="0"/>
+              <a:t>hub</a:t>
+            </a:r>
+            <a:r>
+              <a:rPr lang="en-US" altLang="ko-KR" dirty="0" smtClean="0"/>
+              <a:t> </a:t>
+            </a:r>
+            <a:r>
+              <a:rPr lang="ko-KR" altLang="en-US" dirty="0" smtClean="0"/>
+              <a:t>에 올리기</a:t>
+            </a:r>
+            <a:r>
+              <a:rPr lang="ko-KR" altLang="en-US" dirty="0" smtClean="0"/>
+              <a:t> </a:t>
+            </a:r>
+            <a:endParaRPr lang="en-US" altLang="ko-KR" dirty="0" smtClean="0"/>
+          </a:p>
+          <a:p>
+            <a:r>
+              <a:rPr lang="en-US" altLang="ko-KR" dirty="0" smtClean="0"/>
+              <a:t>    - </a:t>
+            </a:r>
+            <a:r>
+              <a:rPr lang="ko-KR" altLang="en-US" dirty="0" smtClean="0"/>
+              <a:t>원</a:t>
+            </a:r>
+            <a:r>
+              <a:rPr lang="ko-KR" altLang="en-US" dirty="0"/>
+              <a:t>격</a:t>
+            </a:r>
+            <a:r>
+              <a:rPr lang="ko-KR" altLang="en-US" dirty="0" smtClean="0"/>
+              <a:t> </a:t>
+            </a:r>
+            <a:r>
+              <a:rPr lang="en-US" altLang="ko-KR" dirty="0" smtClean="0"/>
+              <a:t>repro main = </a:t>
+            </a:r>
+            <a:r>
+              <a:rPr lang="en-US" altLang="ko-KR" dirty="0" err="1" smtClean="0"/>
+              <a:t>Github</a:t>
+            </a:r>
+            <a:r>
+              <a:rPr lang="en-US" altLang="ko-KR" dirty="0" smtClean="0"/>
+              <a:t> main </a:t>
+            </a:r>
+            <a:r>
+              <a:rPr lang="ko-KR" altLang="en-US" dirty="0" smtClean="0"/>
+              <a:t>에 올리기</a:t>
+            </a:r>
+            <a:endParaRPr lang="en-US" altLang="ko-KR" dirty="0" smtClean="0"/>
+          </a:p>
+          <a:p>
+            <a:r>
+              <a:rPr lang="en-US" altLang="ko-KR" dirty="0"/>
+              <a:t> </a:t>
+            </a:r>
+            <a:r>
+              <a:rPr lang="en-US" altLang="ko-KR" dirty="0" smtClean="0"/>
+              <a:t>     </a:t>
+            </a:r>
+            <a:r>
+              <a:rPr lang="ko-KR" altLang="en-US" dirty="0" smtClean="0"/>
+              <a:t>로컬 </a:t>
+            </a:r>
+            <a:r>
+              <a:rPr lang="en-US" altLang="ko-KR" dirty="0" smtClean="0"/>
+              <a:t>repro main</a:t>
+            </a:r>
+            <a:r>
+              <a:rPr lang="ko-KR" altLang="en-US" dirty="0"/>
+              <a:t> </a:t>
+            </a:r>
+            <a:r>
+              <a:rPr lang="en-US" altLang="ko-KR" dirty="0" smtClean="0"/>
+              <a:t>merge </a:t>
+            </a:r>
+            <a:r>
+              <a:rPr lang="en-US" altLang="ko-KR" dirty="0" smtClean="0">
+                <a:sym typeface="Wingdings" panose="05000000000000000000" pitchFamily="2" charset="2"/>
+              </a:rPr>
+              <a:t> push </a:t>
+            </a:r>
+            <a:endParaRPr lang="en-US" altLang="ko-KR" dirty="0" smtClean="0"/>
+          </a:p>
+          <a:p>
+            <a:r>
+              <a:rPr lang="en-US" altLang="ko-KR" dirty="0"/>
+              <a:t> </a:t>
+            </a:r>
+            <a:r>
+              <a:rPr lang="en-US" altLang="ko-KR" dirty="0" smtClean="0"/>
+              <a:t>   - </a:t>
+            </a:r>
+            <a:r>
+              <a:rPr lang="ko-KR" altLang="en-US" dirty="0" smtClean="0"/>
+              <a:t>원격 </a:t>
+            </a:r>
+            <a:r>
+              <a:rPr lang="en-US" altLang="ko-KR" dirty="0" smtClean="0"/>
+              <a:t>repo </a:t>
+            </a:r>
+            <a:r>
+              <a:rPr lang="en-US" altLang="ko-KR" dirty="0" smtClean="0"/>
+              <a:t> feature  = </a:t>
+            </a:r>
+            <a:r>
+              <a:rPr lang="en-US" altLang="ko-KR" dirty="0" err="1" smtClean="0"/>
+              <a:t>Github</a:t>
+            </a:r>
+            <a:r>
+              <a:rPr lang="en-US" altLang="ko-KR" dirty="0" smtClean="0"/>
+              <a:t> feature </a:t>
+            </a:r>
+            <a:r>
+              <a:rPr lang="ko-KR" altLang="en-US" dirty="0" smtClean="0"/>
+              <a:t>에 올리기</a:t>
+            </a:r>
+            <a:endParaRPr lang="en-US" altLang="ko-KR" dirty="0" smtClean="0"/>
+          </a:p>
+          <a:p>
+            <a:r>
+              <a:rPr lang="en-US" altLang="ko-KR" dirty="0" smtClean="0"/>
+              <a:t>      </a:t>
+            </a:r>
+            <a:r>
+              <a:rPr lang="ko-KR" altLang="en-US" dirty="0"/>
+              <a:t>로컬 </a:t>
+            </a:r>
+            <a:r>
+              <a:rPr lang="en-US" altLang="ko-KR" dirty="0"/>
+              <a:t>repro main</a:t>
+            </a:r>
+            <a:r>
+              <a:rPr lang="ko-KR" altLang="en-US" dirty="0"/>
+              <a:t> </a:t>
+            </a:r>
+            <a:r>
+              <a:rPr lang="en-US" altLang="ko-KR" dirty="0" smtClean="0"/>
+              <a:t>feature </a:t>
+            </a:r>
+            <a:r>
+              <a:rPr lang="en-US" altLang="ko-KR" dirty="0">
+                <a:sym typeface="Wingdings" panose="05000000000000000000" pitchFamily="2" charset="2"/>
+              </a:rPr>
+              <a:t> push </a:t>
+            </a:r>
+            <a:endParaRPr lang="en-US" altLang="ko-KR" dirty="0"/>
+          </a:p>
+          <a:p>
+            <a:r>
+              <a:rPr lang="en-US" altLang="ko-KR" dirty="0" smtClean="0"/>
+              <a:t>    </a:t>
+            </a:r>
+            <a:endParaRPr lang="en-US" altLang="ko-KR" dirty="0" smtClean="0"/>
+          </a:p>
+        </p:txBody>
+      </p:sp>
+      <p:sp>
+        <p:nvSpPr>
+          <p:cNvPr id="8" name="직사각형 7"/>
+          <p:cNvSpPr/>
+          <p:nvPr/>
+        </p:nvSpPr>
+        <p:spPr>
+          <a:xfrm>
+            <a:off x="0" y="0"/>
+            <a:ext cx="12192000" cy="603258"/>
+          </a:xfrm>
+          <a:prstGeom prst="rect">
+            <a:avLst/>
+          </a:prstGeom>
+          <a:solidFill>
+            <a:schemeClr val="accent6">
+              <a:lumMod val="40000"/>
+              <a:lumOff val="60000"/>
+            </a:schemeClr>
+          </a:solidFill>
+        </p:spPr>
+        <p:style>
+          <a:lnRef idx="2">
+            <a:schemeClr val="accent1">
+              <a:shade val="50000"/>
+            </a:schemeClr>
+          </a:lnRef>
+          <a:fillRef idx="1">
+            <a:schemeClr val="accent1"/>
+          </a:fillRef>
+          <a:effectRef idx="0">
+            <a:schemeClr val="accent1"/>
+          </a:effectRef>
+          <a:fontRef idx="minor">
+            <a:schemeClr val="lt1"/>
+          </a:fontRef>
+        </p:style>
+        <p:txBody>
+          <a:bodyPr rtlCol="0" anchor="ctr"/>
+          <a:lstStyle/>
+          <a:p>
+            <a:pPr algn="ctr"/>
+            <a:endParaRPr lang="ko-KR" altLang="en-US"/>
+          </a:p>
+        </p:txBody>
+      </p:sp>
+      <p:sp>
+        <p:nvSpPr>
+          <p:cNvPr id="4" name="TextBox 3"/>
+          <p:cNvSpPr txBox="1"/>
+          <p:nvPr/>
+        </p:nvSpPr>
+        <p:spPr>
+          <a:xfrm>
+            <a:off x="213675" y="123952"/>
+            <a:ext cx="1237839" cy="400110"/>
+          </a:xfrm>
+          <a:prstGeom prst="rect">
+            <a:avLst/>
+          </a:prstGeom>
+          <a:noFill/>
+        </p:spPr>
+        <p:txBody>
+          <a:bodyPr wrap="none" rtlCol="0">
+            <a:spAutoFit/>
+          </a:bodyPr>
+          <a:lstStyle/>
+          <a:p>
+            <a:r>
+              <a:rPr lang="en-US" altLang="ko-KR" sz="2000" b="1" dirty="0" smtClean="0"/>
+              <a:t>TIL </a:t>
+            </a:r>
+            <a:r>
+              <a:rPr lang="ko-KR" altLang="en-US" sz="2000" b="1" dirty="0" smtClean="0"/>
+              <a:t>작성 </a:t>
+            </a:r>
+            <a:endParaRPr lang="en-US" altLang="ko-KR" sz="2000" b="1" dirty="0" smtClean="0"/>
+          </a:p>
+        </p:txBody>
+      </p:sp>
+      <p:sp>
+        <p:nvSpPr>
+          <p:cNvPr id="7" name="TextBox 6"/>
+          <p:cNvSpPr txBox="1"/>
+          <p:nvPr/>
+        </p:nvSpPr>
+        <p:spPr>
+          <a:xfrm>
+            <a:off x="1320035" y="123952"/>
+            <a:ext cx="2149948" cy="400110"/>
+          </a:xfrm>
+          <a:prstGeom prst="rect">
+            <a:avLst/>
+          </a:prstGeom>
+          <a:noFill/>
+        </p:spPr>
+        <p:txBody>
+          <a:bodyPr wrap="none" rtlCol="0">
+            <a:spAutoFit/>
+          </a:bodyPr>
+          <a:lstStyle/>
+          <a:p>
+            <a:r>
+              <a:rPr lang="en-US" altLang="ko-KR" sz="2000" b="1" dirty="0" err="1" smtClean="0"/>
+              <a:t>Git</a:t>
+            </a:r>
+            <a:r>
+              <a:rPr lang="en-US" altLang="ko-KR" sz="2000" b="1" dirty="0" smtClean="0"/>
+              <a:t> </a:t>
+            </a:r>
+            <a:r>
+              <a:rPr lang="ko-KR" altLang="en-US" sz="2000" b="1" dirty="0" smtClean="0"/>
+              <a:t>배우기 </a:t>
+            </a:r>
+            <a:r>
+              <a:rPr lang="en-US" altLang="ko-KR" sz="2000" b="1" dirty="0" smtClean="0"/>
+              <a:t>2</a:t>
+            </a:r>
+            <a:r>
+              <a:rPr lang="ko-KR" altLang="en-US" sz="2000" b="1" dirty="0" smtClean="0"/>
+              <a:t>주차</a:t>
+            </a:r>
+            <a:endParaRPr lang="en-US" altLang="ko-KR" sz="2000" b="1" dirty="0" smtClean="0"/>
+          </a:p>
+        </p:txBody>
+      </p:sp>
+    </p:spTree>
+    <p:extLst>
+      <p:ext uri="{BB962C8B-B14F-4D97-AF65-F5344CB8AC3E}">
+        <p14:creationId xmlns:p14="http://schemas.microsoft.com/office/powerpoint/2010/main" val="3926999147"/>
       </p:ext>
     </p:extLst>
   </p:cSld>

</xml_diff>

<commit_message>
git_week02 브랜치로 작성 20211230 1952
</commit_message>
<xml_diff>
--- a/TIL.pptx
+++ b/TIL.pptx
@@ -3454,7 +3454,7 @@
         <p:spPr>
           <a:xfrm>
             <a:off x="1320035" y="123952"/>
-            <a:ext cx="2149948" cy="400110"/>
+            <a:ext cx="2217274" cy="400110"/>
           </a:xfrm>
           <a:prstGeom prst="rect">
             <a:avLst/>
@@ -3486,6 +3486,10 @@
             <a:r>
               <a:rPr lang="ko-KR" altLang="en-US" sz="2000" b="1" dirty="0" smtClean="0"/>
               <a:t>주차</a:t>
+            </a:r>
+            <a:r>
+              <a:rPr lang="en-US" altLang="ko-KR" sz="2000" b="1" dirty="0" smtClean="0"/>
+              <a:t>.</a:t>
             </a:r>
             <a:endParaRPr lang="en-US" altLang="ko-KR" sz="2000" b="1" dirty="0" smtClean="0"/>
           </a:p>
@@ -3627,11 +3631,7 @@
             </a:r>
             <a:r>
               <a:rPr lang="ko-KR" altLang="en-US" dirty="0" smtClean="0"/>
-              <a:t>주차 </a:t>
-            </a:r>
-            <a:r>
-              <a:rPr lang="ko-KR" altLang="en-US" dirty="0" smtClean="0"/>
-              <a:t>배운 내용  </a:t>
+              <a:t>주차 배운 내용  </a:t>
             </a:r>
             <a:endParaRPr lang="en-US" altLang="ko-KR" dirty="0"/>
           </a:p>
@@ -3672,7 +3672,6 @@
               <a:rPr lang="en-US" altLang="ko-KR" dirty="0" smtClean="0"/>
               <a:t>   </a:t>
             </a:r>
-            <a:endParaRPr lang="en-US" altLang="ko-KR" dirty="0" smtClean="0"/>
           </a:p>
           <a:p>
             <a:pPr marL="342900" indent="-342900">
@@ -3703,11 +3702,7 @@
             </a:r>
             <a:r>
               <a:rPr lang="en-US" altLang="ko-KR" dirty="0" smtClean="0"/>
-              <a:t>   </a:t>
-            </a:r>
-            <a:r>
-              <a:rPr lang="en-US" altLang="ko-KR" dirty="0" smtClean="0"/>
-              <a:t>: </a:t>
+              <a:t>   : </a:t>
             </a:r>
             <a:r>
               <a:rPr lang="ko-KR" altLang="en-US" dirty="0" smtClean="0"/>
@@ -3850,11 +3845,7 @@
             </a:r>
             <a:r>
               <a:rPr lang="en-US" altLang="ko-KR" dirty="0" err="1" smtClean="0"/>
-              <a:t>Git</a:t>
-            </a:r>
-            <a:r>
-              <a:rPr lang="en-US" altLang="ko-KR" dirty="0" err="1" smtClean="0"/>
-              <a:t>hub</a:t>
+              <a:t>Github</a:t>
             </a:r>
             <a:r>
               <a:rPr lang="en-US" altLang="ko-KR" dirty="0" smtClean="0"/>
@@ -3862,11 +3853,7 @@
             </a:r>
             <a:r>
               <a:rPr lang="ko-KR" altLang="en-US" dirty="0" smtClean="0"/>
-              <a:t>에 올리기</a:t>
-            </a:r>
-            <a:r>
-              <a:rPr lang="ko-KR" altLang="en-US" dirty="0" smtClean="0"/>
-              <a:t> </a:t>
+              <a:t>에 올리기 </a:t>
             </a:r>
             <a:endParaRPr lang="en-US" altLang="ko-KR" dirty="0" smtClean="0"/>
           </a:p>
@@ -3953,11 +3940,7 @@
             </a:r>
             <a:r>
               <a:rPr lang="en-US" altLang="ko-KR" dirty="0" smtClean="0"/>
-              <a:t>repo </a:t>
-            </a:r>
-            <a:r>
-              <a:rPr lang="en-US" altLang="ko-KR" dirty="0" smtClean="0"/>
-              <a:t> feature  = </a:t>
+              <a:t>repo  feature  = </a:t>
             </a:r>
             <a:r>
               <a:rPr lang="en-US" altLang="ko-KR" dirty="0" err="1" smtClean="0"/>
@@ -4007,7 +3990,6 @@
               <a:rPr lang="en-US" altLang="ko-KR" dirty="0" smtClean="0"/>
               <a:t>    </a:t>
             </a:r>
-            <a:endParaRPr lang="en-US" altLang="ko-KR" dirty="0" smtClean="0"/>
           </a:p>
         </p:txBody>
       </p:sp>
@@ -4100,7 +4082,7 @@
         <p:spPr>
           <a:xfrm>
             <a:off x="1320035" y="123952"/>
-            <a:ext cx="2149948" cy="400110"/>
+            <a:ext cx="3669915" cy="707886"/>
           </a:xfrm>
           <a:prstGeom prst="rect">
             <a:avLst/>
@@ -4133,6 +4115,12 @@
               <a:rPr lang="ko-KR" altLang="en-US" sz="2000" b="1" dirty="0" smtClean="0"/>
               <a:t>주차</a:t>
             </a:r>
+            <a:r>
+              <a:rPr lang="en-US" altLang="ko-KR" sz="2000" b="1" dirty="0"/>
+              <a:t>. git_week02</a:t>
+            </a:r>
+          </a:p>
+          <a:p>
             <a:endParaRPr lang="en-US" altLang="ko-KR" sz="2000" b="1" dirty="0" smtClean="0"/>
           </a:p>
         </p:txBody>

</xml_diff>

<commit_message>
pull request test 0102 1728
</commit_message>
<xml_diff>
--- a/TIL.pptx
+++ b/TIL.pptx
@@ -7,6 +7,7 @@
   <p:sldIdLst>
     <p:sldId id="256" r:id="rId2"/>
     <p:sldId id="257" r:id="rId3"/>
+    <p:sldId id="258" r:id="rId4"/>
   </p:sldIdLst>
   <p:sldSz cx="12192000" cy="6858000"/>
   <p:notesSz cx="6858000" cy="9144000"/>
@@ -244,7 +245,7 @@
           <a:p>
             <a:fld id="{86F67E18-06E4-43CD-90C6-12F80F0662AD}" type="datetimeFigureOut">
               <a:rPr lang="ko-KR" altLang="en-US" smtClean="0"/>
-              <a:t>2021-12-30</a:t>
+              <a:t>2022-01-02</a:t>
             </a:fld>
             <a:endParaRPr lang="ko-KR" altLang="en-US"/>
           </a:p>
@@ -414,7 +415,7 @@
           <a:p>
             <a:fld id="{86F67E18-06E4-43CD-90C6-12F80F0662AD}" type="datetimeFigureOut">
               <a:rPr lang="ko-KR" altLang="en-US" smtClean="0"/>
-              <a:t>2021-12-30</a:t>
+              <a:t>2022-01-02</a:t>
             </a:fld>
             <a:endParaRPr lang="ko-KR" altLang="en-US"/>
           </a:p>
@@ -594,7 +595,7 @@
           <a:p>
             <a:fld id="{86F67E18-06E4-43CD-90C6-12F80F0662AD}" type="datetimeFigureOut">
               <a:rPr lang="ko-KR" altLang="en-US" smtClean="0"/>
-              <a:t>2021-12-30</a:t>
+              <a:t>2022-01-02</a:t>
             </a:fld>
             <a:endParaRPr lang="ko-KR" altLang="en-US"/>
           </a:p>
@@ -764,7 +765,7 @@
           <a:p>
             <a:fld id="{86F67E18-06E4-43CD-90C6-12F80F0662AD}" type="datetimeFigureOut">
               <a:rPr lang="ko-KR" altLang="en-US" smtClean="0"/>
-              <a:t>2021-12-30</a:t>
+              <a:t>2022-01-02</a:t>
             </a:fld>
             <a:endParaRPr lang="ko-KR" altLang="en-US"/>
           </a:p>
@@ -1010,7 +1011,7 @@
           <a:p>
             <a:fld id="{86F67E18-06E4-43CD-90C6-12F80F0662AD}" type="datetimeFigureOut">
               <a:rPr lang="ko-KR" altLang="en-US" smtClean="0"/>
-              <a:t>2021-12-30</a:t>
+              <a:t>2022-01-02</a:t>
             </a:fld>
             <a:endParaRPr lang="ko-KR" altLang="en-US"/>
           </a:p>
@@ -1242,7 +1243,7 @@
           <a:p>
             <a:fld id="{86F67E18-06E4-43CD-90C6-12F80F0662AD}" type="datetimeFigureOut">
               <a:rPr lang="ko-KR" altLang="en-US" smtClean="0"/>
-              <a:t>2021-12-30</a:t>
+              <a:t>2022-01-02</a:t>
             </a:fld>
             <a:endParaRPr lang="ko-KR" altLang="en-US"/>
           </a:p>
@@ -1609,7 +1610,7 @@
           <a:p>
             <a:fld id="{86F67E18-06E4-43CD-90C6-12F80F0662AD}" type="datetimeFigureOut">
               <a:rPr lang="ko-KR" altLang="en-US" smtClean="0"/>
-              <a:t>2021-12-30</a:t>
+              <a:t>2022-01-02</a:t>
             </a:fld>
             <a:endParaRPr lang="ko-KR" altLang="en-US"/>
           </a:p>
@@ -1727,7 +1728,7 @@
           <a:p>
             <a:fld id="{86F67E18-06E4-43CD-90C6-12F80F0662AD}" type="datetimeFigureOut">
               <a:rPr lang="ko-KR" altLang="en-US" smtClean="0"/>
-              <a:t>2021-12-30</a:t>
+              <a:t>2022-01-02</a:t>
             </a:fld>
             <a:endParaRPr lang="ko-KR" altLang="en-US"/>
           </a:p>
@@ -1822,7 +1823,7 @@
           <a:p>
             <a:fld id="{86F67E18-06E4-43CD-90C6-12F80F0662AD}" type="datetimeFigureOut">
               <a:rPr lang="ko-KR" altLang="en-US" smtClean="0"/>
-              <a:t>2021-12-30</a:t>
+              <a:t>2022-01-02</a:t>
             </a:fld>
             <a:endParaRPr lang="ko-KR" altLang="en-US"/>
           </a:p>
@@ -2099,7 +2100,7 @@
           <a:p>
             <a:fld id="{86F67E18-06E4-43CD-90C6-12F80F0662AD}" type="datetimeFigureOut">
               <a:rPr lang="ko-KR" altLang="en-US" smtClean="0"/>
-              <a:t>2021-12-30</a:t>
+              <a:t>2022-01-02</a:t>
             </a:fld>
             <a:endParaRPr lang="ko-KR" altLang="en-US"/>
           </a:p>
@@ -2352,7 +2353,7 @@
           <a:p>
             <a:fld id="{86F67E18-06E4-43CD-90C6-12F80F0662AD}" type="datetimeFigureOut">
               <a:rPr lang="ko-KR" altLang="en-US" smtClean="0"/>
-              <a:t>2021-12-30</a:t>
+              <a:t>2022-01-02</a:t>
             </a:fld>
             <a:endParaRPr lang="ko-KR" altLang="en-US"/>
           </a:p>
@@ -2565,7 +2566,7 @@
           <a:p>
             <a:fld id="{86F67E18-06E4-43CD-90C6-12F80F0662AD}" type="datetimeFigureOut">
               <a:rPr lang="ko-KR" altLang="en-US" smtClean="0"/>
-              <a:t>2021-12-30</a:t>
+              <a:t>2022-01-02</a:t>
             </a:fld>
             <a:endParaRPr lang="ko-KR" altLang="en-US"/>
           </a:p>
@@ -3491,7 +3492,6 @@
               <a:rPr lang="en-US" altLang="ko-KR" sz="2000" b="1" dirty="0" smtClean="0"/>
               <a:t>.</a:t>
             </a:r>
-            <a:endParaRPr lang="en-US" altLang="ko-KR" sz="2000" b="1" dirty="0" smtClean="0"/>
           </a:p>
         </p:txBody>
       </p:sp>
@@ -4129,6 +4129,641 @@
     <p:extLst>
       <p:ext uri="{BB962C8B-B14F-4D97-AF65-F5344CB8AC3E}">
         <p14:creationId xmlns:p14="http://schemas.microsoft.com/office/powerpoint/2010/main" val="3926999147"/>
+      </p:ext>
+    </p:extLst>
+  </p:cSld>
+  <p:clrMapOvr>
+    <a:masterClrMapping/>
+  </p:clrMapOvr>
+</p:sld>
+</file>
+
+<file path=ppt/slides/slide3.xml><?xml version="1.0" encoding="utf-8"?>
+<p:sld xmlns:a="http://schemas.openxmlformats.org/drawingml/2006/main" xmlns:r="http://schemas.openxmlformats.org/officeDocument/2006/relationships" xmlns:p="http://schemas.openxmlformats.org/presentationml/2006/main">
+  <p:cSld>
+    <p:spTree>
+      <p:nvGrpSpPr>
+        <p:cNvPr id="1" name=""/>
+        <p:cNvGrpSpPr/>
+        <p:nvPr/>
+      </p:nvGrpSpPr>
+      <p:grpSpPr>
+        <a:xfrm>
+          <a:off x="0" y="0"/>
+          <a:ext cx="0" cy="0"/>
+          <a:chOff x="0" y="0"/>
+          <a:chExt cx="0" cy="0"/>
+        </a:xfrm>
+      </p:grpSpPr>
+      <p:sp>
+        <p:nvSpPr>
+          <p:cNvPr id="5" name="TextBox 4"/>
+          <p:cNvSpPr txBox="1"/>
+          <p:nvPr/>
+        </p:nvSpPr>
+        <p:spPr>
+          <a:xfrm>
+            <a:off x="457515" y="977538"/>
+            <a:ext cx="6747360" cy="369332"/>
+          </a:xfrm>
+          <a:prstGeom prst="rect">
+            <a:avLst/>
+          </a:prstGeom>
+          <a:noFill/>
+        </p:spPr>
+        <p:txBody>
+          <a:bodyPr wrap="none" rtlCol="0">
+            <a:spAutoFit/>
+          </a:bodyPr>
+          <a:lstStyle/>
+          <a:p>
+            <a:r>
+              <a:rPr lang="ko-KR" altLang="en-US" dirty="0" smtClean="0"/>
+              <a:t>학습 목적 </a:t>
+            </a:r>
+            <a:r>
+              <a:rPr lang="en-US" altLang="ko-KR" dirty="0" smtClean="0"/>
+              <a:t>:</a:t>
+            </a:r>
+            <a:r>
+              <a:rPr lang="ko-KR" altLang="en-US" dirty="0" err="1" smtClean="0"/>
+              <a:t>협업할때의</a:t>
+            </a:r>
+            <a:r>
+              <a:rPr lang="ko-KR" altLang="en-US" dirty="0" smtClean="0"/>
+              <a:t> 단계</a:t>
+            </a:r>
+            <a:r>
+              <a:rPr lang="en-US" altLang="ko-KR" dirty="0" smtClean="0"/>
+              <a:t>, </a:t>
+            </a:r>
+            <a:r>
+              <a:rPr lang="ko-KR" altLang="en-US" dirty="0" err="1" smtClean="0"/>
+              <a:t>브랜치</a:t>
+            </a:r>
+            <a:r>
+              <a:rPr lang="ko-KR" altLang="en-US" dirty="0" smtClean="0"/>
+              <a:t> 관리 </a:t>
+            </a:r>
+            <a:r>
+              <a:rPr lang="en-US" altLang="ko-KR" dirty="0" smtClean="0"/>
+              <a:t>, </a:t>
+            </a:r>
+            <a:r>
+              <a:rPr lang="en-US" altLang="ko-KR" dirty="0" err="1" smtClean="0"/>
+              <a:t>Github</a:t>
+            </a:r>
+            <a:r>
+              <a:rPr lang="en-US" altLang="ko-KR" dirty="0" smtClean="0"/>
+              <a:t> </a:t>
+            </a:r>
+            <a:r>
+              <a:rPr lang="ko-KR" altLang="en-US" dirty="0" smtClean="0"/>
+              <a:t>에 </a:t>
+            </a:r>
+            <a:r>
+              <a:rPr lang="en-US" altLang="ko-KR" dirty="0" smtClean="0"/>
+              <a:t>push </a:t>
+            </a:r>
+            <a:r>
+              <a:rPr lang="ko-KR" altLang="en-US" dirty="0" smtClean="0"/>
+              <a:t>하기</a:t>
+            </a:r>
+            <a:endParaRPr lang="en-US" altLang="ko-KR" dirty="0" smtClean="0"/>
+          </a:p>
+        </p:txBody>
+      </p:sp>
+      <p:sp>
+        <p:nvSpPr>
+          <p:cNvPr id="6" name="TextBox 5"/>
+          <p:cNvSpPr txBox="1"/>
+          <p:nvPr/>
+        </p:nvSpPr>
+        <p:spPr>
+          <a:xfrm>
+            <a:off x="457515" y="1533220"/>
+            <a:ext cx="8988999" cy="4801314"/>
+          </a:xfrm>
+          <a:prstGeom prst="rect">
+            <a:avLst/>
+          </a:prstGeom>
+          <a:noFill/>
+        </p:spPr>
+        <p:txBody>
+          <a:bodyPr wrap="none" rtlCol="0">
+            <a:spAutoFit/>
+          </a:bodyPr>
+          <a:lstStyle/>
+          <a:p>
+            <a:r>
+              <a:rPr lang="en-US" altLang="ko-KR" dirty="0" smtClean="0"/>
+              <a:t>2 </a:t>
+            </a:r>
+            <a:r>
+              <a:rPr lang="ko-KR" altLang="en-US" dirty="0" smtClean="0"/>
+              <a:t>주차 배운 내용  </a:t>
+            </a:r>
+            <a:endParaRPr lang="en-US" altLang="ko-KR" dirty="0"/>
+          </a:p>
+          <a:p>
+            <a:endParaRPr lang="en-US" altLang="ko-KR" dirty="0" smtClean="0"/>
+          </a:p>
+          <a:p>
+            <a:pPr marL="342900" indent="-342900">
+              <a:buAutoNum type="arabicParenR"/>
+            </a:pPr>
+            <a:r>
+              <a:rPr lang="ko-KR" altLang="en-US" dirty="0" smtClean="0"/>
+              <a:t>협업 </a:t>
+            </a:r>
+            <a:endParaRPr lang="en-US" altLang="ko-KR" dirty="0" smtClean="0"/>
+          </a:p>
+          <a:p>
+            <a:r>
+              <a:rPr lang="en-US" altLang="ko-KR" dirty="0" smtClean="0"/>
+              <a:t>    </a:t>
+            </a:r>
+            <a:r>
+              <a:rPr lang="ko-KR" altLang="en-US" dirty="0" err="1" smtClean="0"/>
+              <a:t>브랜치</a:t>
+            </a:r>
+            <a:r>
+              <a:rPr lang="ko-KR" altLang="en-US" dirty="0" smtClean="0"/>
+              <a:t> 생성하기 </a:t>
+            </a:r>
+            <a:endParaRPr lang="en-US" altLang="ko-KR" dirty="0" smtClean="0"/>
+          </a:p>
+          <a:p>
+            <a:r>
+              <a:rPr lang="en-US" altLang="ko-KR" dirty="0"/>
+              <a:t> </a:t>
+            </a:r>
+            <a:r>
+              <a:rPr lang="en-US" altLang="ko-KR" dirty="0" smtClean="0"/>
+              <a:t>   </a:t>
+            </a:r>
+          </a:p>
+          <a:p>
+            <a:pPr marL="342900" indent="-342900">
+              <a:buAutoNum type="arabicParenR" startAt="2"/>
+            </a:pPr>
+            <a:r>
+              <a:rPr lang="ko-KR" altLang="en-US" dirty="0" err="1" smtClean="0"/>
+              <a:t>브랜치</a:t>
+            </a:r>
+            <a:r>
+              <a:rPr lang="ko-KR" altLang="en-US" dirty="0" smtClean="0"/>
+              <a:t> </a:t>
+            </a:r>
+            <a:r>
+              <a:rPr lang="en-US" altLang="ko-KR" dirty="0" smtClean="0"/>
+              <a:t>Merge </a:t>
+            </a:r>
+            <a:r>
+              <a:rPr lang="ko-KR" altLang="en-US" dirty="0" smtClean="0"/>
+              <a:t>하기</a:t>
+            </a:r>
+            <a:endParaRPr lang="en-US" altLang="ko-KR" dirty="0" smtClean="0"/>
+          </a:p>
+          <a:p>
+            <a:r>
+              <a:rPr lang="en-US" altLang="ko-KR" dirty="0"/>
+              <a:t> </a:t>
+            </a:r>
+            <a:r>
+              <a:rPr lang="en-US" altLang="ko-KR" dirty="0" smtClean="0"/>
+              <a:t>   : </a:t>
+            </a:r>
+            <a:r>
+              <a:rPr lang="ko-KR" altLang="en-US" dirty="0" smtClean="0"/>
+              <a:t>로컬 </a:t>
+            </a:r>
+            <a:r>
+              <a:rPr lang="en-US" altLang="ko-KR" dirty="0" smtClean="0"/>
+              <a:t>repro </a:t>
+            </a:r>
+            <a:r>
+              <a:rPr lang="ko-KR" altLang="en-US" dirty="0" smtClean="0"/>
+              <a:t>에서 </a:t>
+            </a:r>
+            <a:r>
+              <a:rPr lang="en-US" altLang="ko-KR" dirty="0" smtClean="0"/>
+              <a:t>Merge </a:t>
+            </a:r>
+            <a:r>
+              <a:rPr lang="ko-KR" altLang="en-US" dirty="0" smtClean="0"/>
+              <a:t>하기 </a:t>
+            </a:r>
+            <a:endParaRPr lang="en-US" altLang="ko-KR" dirty="0" smtClean="0"/>
+          </a:p>
+          <a:p>
+            <a:r>
+              <a:rPr lang="en-US" altLang="ko-KR" dirty="0"/>
+              <a:t> </a:t>
+            </a:r>
+            <a:r>
+              <a:rPr lang="en-US" altLang="ko-KR" dirty="0" smtClean="0"/>
+              <a:t>     - </a:t>
+            </a:r>
+            <a:r>
+              <a:rPr lang="ko-KR" altLang="en-US" dirty="0" smtClean="0"/>
+              <a:t>목적지 </a:t>
+            </a:r>
+            <a:r>
+              <a:rPr lang="ko-KR" altLang="en-US" dirty="0" err="1" smtClean="0"/>
+              <a:t>브랜치</a:t>
+            </a:r>
+            <a:r>
+              <a:rPr lang="ko-KR" altLang="en-US" dirty="0" smtClean="0"/>
+              <a:t> </a:t>
+            </a:r>
+            <a:r>
+              <a:rPr lang="en-US" altLang="ko-KR" dirty="0" smtClean="0"/>
+              <a:t>check-out </a:t>
+            </a:r>
+            <a:r>
+              <a:rPr lang="ko-KR" altLang="en-US" dirty="0" smtClean="0"/>
+              <a:t>하기 </a:t>
+            </a:r>
+            <a:r>
+              <a:rPr lang="en-US" altLang="ko-KR" dirty="0" smtClean="0"/>
+              <a:t>--&gt; </a:t>
+            </a:r>
+            <a:r>
+              <a:rPr lang="ko-KR" altLang="en-US" dirty="0" smtClean="0"/>
+              <a:t>머지 대상 </a:t>
+            </a:r>
+            <a:r>
+              <a:rPr lang="en-US" altLang="ko-KR" dirty="0" err="1" smtClean="0"/>
+              <a:t>brach</a:t>
+            </a:r>
+            <a:r>
+              <a:rPr lang="en-US" altLang="ko-KR" dirty="0" smtClean="0"/>
+              <a:t> </a:t>
+            </a:r>
+            <a:r>
+              <a:rPr lang="ko-KR" altLang="en-US" dirty="0" err="1" smtClean="0"/>
+              <a:t>선택후</a:t>
+            </a:r>
+            <a:r>
+              <a:rPr lang="ko-KR" altLang="en-US" dirty="0" smtClean="0"/>
+              <a:t> </a:t>
+            </a:r>
+            <a:r>
+              <a:rPr lang="en-US" altLang="ko-KR" dirty="0" smtClean="0"/>
+              <a:t>merge </a:t>
+            </a:r>
+            <a:r>
+              <a:rPr lang="ko-KR" altLang="en-US" dirty="0" smtClean="0"/>
+              <a:t>버튼 누르기</a:t>
+            </a:r>
+            <a:endParaRPr lang="en-US" altLang="ko-KR" dirty="0"/>
+          </a:p>
+          <a:p>
+            <a:r>
+              <a:rPr lang="ko-KR" altLang="en-US" dirty="0" smtClean="0"/>
+              <a:t>    </a:t>
+            </a:r>
+            <a:r>
+              <a:rPr lang="en-US" altLang="ko-KR" dirty="0" smtClean="0"/>
+              <a:t>: Merge</a:t>
+            </a:r>
+            <a:r>
+              <a:rPr lang="ko-KR" altLang="en-US" dirty="0" smtClean="0"/>
+              <a:t> </a:t>
+            </a:r>
+            <a:r>
+              <a:rPr lang="en-US" altLang="ko-KR" dirty="0"/>
+              <a:t>Conflict </a:t>
+            </a:r>
+            <a:r>
+              <a:rPr lang="ko-KR" altLang="en-US" dirty="0"/>
+              <a:t>해결하기</a:t>
+            </a:r>
+            <a:endParaRPr lang="en-US" altLang="ko-KR" dirty="0"/>
+          </a:p>
+          <a:p>
+            <a:r>
+              <a:rPr lang="en-US" altLang="ko-KR" dirty="0" smtClean="0"/>
+              <a:t>    : </a:t>
+            </a:r>
+            <a:r>
+              <a:rPr lang="ko-KR" altLang="en-US" dirty="0" smtClean="0"/>
+              <a:t>로컬 </a:t>
+            </a:r>
+            <a:r>
+              <a:rPr lang="en-US" altLang="ko-KR" dirty="0" smtClean="0"/>
+              <a:t>repro </a:t>
+            </a:r>
+            <a:r>
+              <a:rPr lang="ko-KR" altLang="en-US" dirty="0" err="1" smtClean="0"/>
+              <a:t>브랜치</a:t>
+            </a:r>
+            <a:r>
+              <a:rPr lang="ko-KR" altLang="en-US" dirty="0" smtClean="0"/>
+              <a:t> 삭제하기 </a:t>
+            </a:r>
+            <a:endParaRPr lang="en-US" altLang="ko-KR" dirty="0" smtClean="0"/>
+          </a:p>
+          <a:p>
+            <a:endParaRPr lang="en-US" altLang="ko-KR" dirty="0" smtClean="0"/>
+          </a:p>
+          <a:p>
+            <a:r>
+              <a:rPr lang="en-US" altLang="ko-KR" dirty="0" smtClean="0"/>
+              <a:t>3) </a:t>
+            </a:r>
+            <a:r>
+              <a:rPr lang="en-US" altLang="ko-KR" dirty="0" err="1" smtClean="0"/>
+              <a:t>Github</a:t>
+            </a:r>
+            <a:r>
+              <a:rPr lang="en-US" altLang="ko-KR" dirty="0" smtClean="0"/>
+              <a:t> </a:t>
+            </a:r>
+            <a:r>
+              <a:rPr lang="ko-KR" altLang="en-US" dirty="0" smtClean="0"/>
+              <a:t>에 올리기 </a:t>
+            </a:r>
+            <a:endParaRPr lang="en-US" altLang="ko-KR" dirty="0" smtClean="0"/>
+          </a:p>
+          <a:p>
+            <a:r>
+              <a:rPr lang="en-US" altLang="ko-KR" dirty="0" smtClean="0"/>
+              <a:t>    - </a:t>
+            </a:r>
+            <a:r>
+              <a:rPr lang="ko-KR" altLang="en-US" dirty="0" smtClean="0"/>
+              <a:t>원</a:t>
+            </a:r>
+            <a:r>
+              <a:rPr lang="ko-KR" altLang="en-US" dirty="0"/>
+              <a:t>격</a:t>
+            </a:r>
+            <a:r>
+              <a:rPr lang="ko-KR" altLang="en-US" dirty="0" smtClean="0"/>
+              <a:t> </a:t>
+            </a:r>
+            <a:r>
+              <a:rPr lang="en-US" altLang="ko-KR" dirty="0" smtClean="0"/>
+              <a:t>repro main = </a:t>
+            </a:r>
+            <a:r>
+              <a:rPr lang="en-US" altLang="ko-KR" dirty="0" err="1" smtClean="0"/>
+              <a:t>Github</a:t>
+            </a:r>
+            <a:r>
+              <a:rPr lang="en-US" altLang="ko-KR" dirty="0" smtClean="0"/>
+              <a:t> main </a:t>
+            </a:r>
+            <a:r>
+              <a:rPr lang="ko-KR" altLang="en-US" dirty="0" smtClean="0"/>
+              <a:t>에 올리기</a:t>
+            </a:r>
+            <a:endParaRPr lang="en-US" altLang="ko-KR" dirty="0" smtClean="0"/>
+          </a:p>
+          <a:p>
+            <a:r>
+              <a:rPr lang="en-US" altLang="ko-KR" dirty="0"/>
+              <a:t> </a:t>
+            </a:r>
+            <a:r>
+              <a:rPr lang="en-US" altLang="ko-KR" dirty="0" smtClean="0"/>
+              <a:t>     </a:t>
+            </a:r>
+            <a:r>
+              <a:rPr lang="ko-KR" altLang="en-US" dirty="0" smtClean="0"/>
+              <a:t>로컬 </a:t>
+            </a:r>
+            <a:r>
+              <a:rPr lang="en-US" altLang="ko-KR" dirty="0" smtClean="0"/>
+              <a:t>repro main</a:t>
+            </a:r>
+            <a:r>
+              <a:rPr lang="ko-KR" altLang="en-US" dirty="0"/>
+              <a:t> </a:t>
+            </a:r>
+            <a:r>
+              <a:rPr lang="en-US" altLang="ko-KR" dirty="0" smtClean="0"/>
+              <a:t>merge </a:t>
+            </a:r>
+            <a:r>
+              <a:rPr lang="en-US" altLang="ko-KR" dirty="0" smtClean="0">
+                <a:sym typeface="Wingdings" panose="05000000000000000000" pitchFamily="2" charset="2"/>
+              </a:rPr>
+              <a:t> push </a:t>
+            </a:r>
+            <a:endParaRPr lang="en-US" altLang="ko-KR" dirty="0" smtClean="0"/>
+          </a:p>
+          <a:p>
+            <a:r>
+              <a:rPr lang="en-US" altLang="ko-KR" dirty="0"/>
+              <a:t> </a:t>
+            </a:r>
+            <a:r>
+              <a:rPr lang="en-US" altLang="ko-KR" dirty="0" smtClean="0"/>
+              <a:t>   - </a:t>
+            </a:r>
+            <a:r>
+              <a:rPr lang="ko-KR" altLang="en-US" dirty="0" smtClean="0"/>
+              <a:t>원격 </a:t>
+            </a:r>
+            <a:r>
+              <a:rPr lang="en-US" altLang="ko-KR" dirty="0" smtClean="0"/>
+              <a:t>repo  feature  = </a:t>
+            </a:r>
+            <a:r>
+              <a:rPr lang="en-US" altLang="ko-KR" dirty="0" err="1" smtClean="0"/>
+              <a:t>Github</a:t>
+            </a:r>
+            <a:r>
+              <a:rPr lang="en-US" altLang="ko-KR" dirty="0" smtClean="0"/>
+              <a:t> feature </a:t>
+            </a:r>
+            <a:r>
+              <a:rPr lang="ko-KR" altLang="en-US" dirty="0" smtClean="0"/>
+              <a:t>에 올리기</a:t>
+            </a:r>
+            <a:endParaRPr lang="en-US" altLang="ko-KR" dirty="0" smtClean="0"/>
+          </a:p>
+          <a:p>
+            <a:r>
+              <a:rPr lang="en-US" altLang="ko-KR" dirty="0" smtClean="0"/>
+              <a:t>      </a:t>
+            </a:r>
+            <a:r>
+              <a:rPr lang="ko-KR" altLang="en-US" dirty="0"/>
+              <a:t>로컬 </a:t>
+            </a:r>
+            <a:r>
+              <a:rPr lang="en-US" altLang="ko-KR" dirty="0"/>
+              <a:t>repro main</a:t>
+            </a:r>
+            <a:r>
+              <a:rPr lang="ko-KR" altLang="en-US" dirty="0"/>
+              <a:t> </a:t>
+            </a:r>
+            <a:r>
+              <a:rPr lang="en-US" altLang="ko-KR" dirty="0" smtClean="0"/>
+              <a:t>feature </a:t>
+            </a:r>
+            <a:r>
+              <a:rPr lang="en-US" altLang="ko-KR" dirty="0">
+                <a:sym typeface="Wingdings" panose="05000000000000000000" pitchFamily="2" charset="2"/>
+              </a:rPr>
+              <a:t> push </a:t>
+            </a:r>
+            <a:endParaRPr lang="en-US" altLang="ko-KR" dirty="0"/>
+          </a:p>
+          <a:p>
+            <a:r>
+              <a:rPr lang="en-US" altLang="ko-KR" dirty="0" smtClean="0"/>
+              <a:t>    </a:t>
+            </a:r>
+          </a:p>
+        </p:txBody>
+      </p:sp>
+      <p:sp>
+        <p:nvSpPr>
+          <p:cNvPr id="8" name="직사각형 7"/>
+          <p:cNvSpPr/>
+          <p:nvPr/>
+        </p:nvSpPr>
+        <p:spPr>
+          <a:xfrm>
+            <a:off x="0" y="0"/>
+            <a:ext cx="12192000" cy="603258"/>
+          </a:xfrm>
+          <a:prstGeom prst="rect">
+            <a:avLst/>
+          </a:prstGeom>
+          <a:solidFill>
+            <a:schemeClr val="accent6">
+              <a:lumMod val="40000"/>
+              <a:lumOff val="60000"/>
+            </a:schemeClr>
+          </a:solidFill>
+        </p:spPr>
+        <p:style>
+          <a:lnRef idx="2">
+            <a:schemeClr val="accent1">
+              <a:shade val="50000"/>
+            </a:schemeClr>
+          </a:lnRef>
+          <a:fillRef idx="1">
+            <a:schemeClr val="accent1"/>
+          </a:fillRef>
+          <a:effectRef idx="0">
+            <a:schemeClr val="accent1"/>
+          </a:effectRef>
+          <a:fontRef idx="minor">
+            <a:schemeClr val="lt1"/>
+          </a:fontRef>
+        </p:style>
+        <p:txBody>
+          <a:bodyPr rtlCol="0" anchor="ctr"/>
+          <a:lstStyle/>
+          <a:p>
+            <a:pPr algn="ctr"/>
+            <a:endParaRPr lang="ko-KR" altLang="en-US"/>
+          </a:p>
+        </p:txBody>
+      </p:sp>
+      <p:sp>
+        <p:nvSpPr>
+          <p:cNvPr id="4" name="TextBox 3"/>
+          <p:cNvSpPr txBox="1"/>
+          <p:nvPr/>
+        </p:nvSpPr>
+        <p:spPr>
+          <a:xfrm>
+            <a:off x="213675" y="123952"/>
+            <a:ext cx="1237839" cy="400110"/>
+          </a:xfrm>
+          <a:prstGeom prst="rect">
+            <a:avLst/>
+          </a:prstGeom>
+          <a:noFill/>
+        </p:spPr>
+        <p:txBody>
+          <a:bodyPr wrap="none" rtlCol="0">
+            <a:spAutoFit/>
+          </a:bodyPr>
+          <a:lstStyle/>
+          <a:p>
+            <a:r>
+              <a:rPr lang="en-US" altLang="ko-KR" sz="2000" b="1" dirty="0" smtClean="0"/>
+              <a:t>TIL </a:t>
+            </a:r>
+            <a:r>
+              <a:rPr lang="ko-KR" altLang="en-US" sz="2000" b="1" dirty="0" smtClean="0"/>
+              <a:t>작성 </a:t>
+            </a:r>
+            <a:endParaRPr lang="en-US" altLang="ko-KR" sz="2000" b="1" dirty="0" smtClean="0"/>
+          </a:p>
+        </p:txBody>
+      </p:sp>
+      <p:sp>
+        <p:nvSpPr>
+          <p:cNvPr id="7" name="TextBox 6"/>
+          <p:cNvSpPr txBox="1"/>
+          <p:nvPr/>
+        </p:nvSpPr>
+        <p:spPr>
+          <a:xfrm>
+            <a:off x="1320035" y="123952"/>
+            <a:ext cx="3669915" cy="707886"/>
+          </a:xfrm>
+          <a:prstGeom prst="rect">
+            <a:avLst/>
+          </a:prstGeom>
+          <a:noFill/>
+        </p:spPr>
+        <p:txBody>
+          <a:bodyPr wrap="none" rtlCol="0">
+            <a:spAutoFit/>
+          </a:bodyPr>
+          <a:lstStyle/>
+          <a:p>
+            <a:r>
+              <a:rPr lang="en-US" altLang="ko-KR" sz="2000" b="1" dirty="0" err="1" smtClean="0"/>
+              <a:t>Git</a:t>
+            </a:r>
+            <a:r>
+              <a:rPr lang="en-US" altLang="ko-KR" sz="2000" b="1" dirty="0" smtClean="0"/>
+              <a:t> </a:t>
+            </a:r>
+            <a:r>
+              <a:rPr lang="ko-KR" altLang="en-US" sz="2000" b="1" dirty="0" smtClean="0"/>
+              <a:t>배우기 </a:t>
+            </a:r>
+            <a:r>
+              <a:rPr lang="en-US" altLang="ko-KR" sz="2000" b="1" dirty="0"/>
+              <a:t>3</a:t>
+            </a:r>
+            <a:r>
+              <a:rPr lang="ko-KR" altLang="en-US" sz="2000" b="1" dirty="0" smtClean="0"/>
+              <a:t>주차</a:t>
+            </a:r>
+            <a:r>
+              <a:rPr lang="en-US" altLang="ko-KR" sz="2000" b="1" dirty="0"/>
+              <a:t>. </a:t>
+            </a:r>
+            <a:r>
+              <a:rPr lang="en-US" altLang="ko-KR" sz="2000" b="1" dirty="0" smtClean="0"/>
+              <a:t>git_week03</a:t>
+            </a:r>
+            <a:endParaRPr lang="en-US" altLang="ko-KR" sz="2000" b="1" dirty="0"/>
+          </a:p>
+          <a:p>
+            <a:endParaRPr lang="en-US" altLang="ko-KR" sz="2000" b="1" dirty="0" smtClean="0"/>
+          </a:p>
+        </p:txBody>
+      </p:sp>
+    </p:spTree>
+    <p:extLst>
+      <p:ext uri="{BB962C8B-B14F-4D97-AF65-F5344CB8AC3E}">
+        <p14:creationId xmlns:p14="http://schemas.microsoft.com/office/powerpoint/2010/main" val="3380559499"/>
       </p:ext>
     </p:extLst>
   </p:cSld>

</xml_diff>